<commit_message>
updating ppt view for the tableau chat works
</commit_message>
<xml_diff>
--- a/Book1.pptx
+++ b/Book1.pptx
@@ -1,16 +1,16 @@
 
 <file path=ppt/presentation.xml><?xml version="1.0" encoding="utf-8"?>
-<p:presentation xmlns:a="http://schemas.openxmlformats.org/drawingml/2006/main" xmlns:p="http://schemas.openxmlformats.org/presentationml/2006/main" xmlns:r="http://schemas.openxmlformats.org/officeDocument/2006/relationships" saveSubsetFonts="1">
+<p:presentation xmlns:a="http://schemas.openxmlformats.org/drawingml/2006/main" xmlns:r="http://schemas.openxmlformats.org/officeDocument/2006/relationships" xmlns:p="http://schemas.openxmlformats.org/presentationml/2006/main" saveSubsetFonts="1">
   <p:sldMasterIdLst>
     <p:sldMasterId id="2147483648" r:id="rId1"/>
   </p:sldMasterIdLst>
   <p:sldIdLst>
-    <p:sldId id="256" r:id="rId6"/>
-    <p:sldId id="257" r:id="rId7"/>
-    <p:sldId id="258" r:id="rId8"/>
-    <p:sldId id="259" r:id="rId9"/>
-    <p:sldId id="260" r:id="rId10"/>
-    <p:sldId id="261" r:id="rId11"/>
+    <p:sldId id="256" r:id="rId2"/>
+    <p:sldId id="260" r:id="rId3"/>
+    <p:sldId id="257" r:id="rId4"/>
+    <p:sldId id="258" r:id="rId5"/>
+    <p:sldId id="261" r:id="rId6"/>
+    <p:sldId id="259" r:id="rId7"/>
   </p:sldIdLst>
   <p:sldSz cx="12192000" cy="6858000"/>
   <p:notesSz cx="6858000" cy="9144000"/>
@@ -18,8 +18,8 @@
     <a:defPPr>
       <a:defRPr lang="en-US"/>
     </a:defPPr>
-    <a:lvl1pPr algn="l" defTabSz="914400" eaLnBrk="1" hangingPunct="1" latinLnBrk="0" marL="0" rtl="0">
-      <a:defRPr kern="1200" sz="1800">
+    <a:lvl1pPr marL="0" algn="l" defTabSz="914400" rtl="0" eaLnBrk="1" latinLnBrk="0" hangingPunct="1">
+      <a:defRPr sz="1800" kern="1200">
         <a:solidFill>
           <a:schemeClr val="tx1"/>
         </a:solidFill>
@@ -28,8 +28,8 @@
         <a:cs typeface="+mn-cs"/>
       </a:defRPr>
     </a:lvl1pPr>
-    <a:lvl2pPr algn="l" defTabSz="914400" eaLnBrk="1" hangingPunct="1" latinLnBrk="0" marL="457200" rtl="0">
-      <a:defRPr kern="1200" sz="1800">
+    <a:lvl2pPr marL="457200" algn="l" defTabSz="914400" rtl="0" eaLnBrk="1" latinLnBrk="0" hangingPunct="1">
+      <a:defRPr sz="1800" kern="1200">
         <a:solidFill>
           <a:schemeClr val="tx1"/>
         </a:solidFill>
@@ -38,8 +38,8 @@
         <a:cs typeface="+mn-cs"/>
       </a:defRPr>
     </a:lvl2pPr>
-    <a:lvl3pPr algn="l" defTabSz="914400" eaLnBrk="1" hangingPunct="1" latinLnBrk="0" marL="914400" rtl="0">
-      <a:defRPr kern="1200" sz="1800">
+    <a:lvl3pPr marL="914400" algn="l" defTabSz="914400" rtl="0" eaLnBrk="1" latinLnBrk="0" hangingPunct="1">
+      <a:defRPr sz="1800" kern="1200">
         <a:solidFill>
           <a:schemeClr val="tx1"/>
         </a:solidFill>
@@ -48,8 +48,8 @@
         <a:cs typeface="+mn-cs"/>
       </a:defRPr>
     </a:lvl3pPr>
-    <a:lvl4pPr algn="l" defTabSz="914400" eaLnBrk="1" hangingPunct="1" latinLnBrk="0" marL="1371600" rtl="0">
-      <a:defRPr kern="1200" sz="1800">
+    <a:lvl4pPr marL="1371600" algn="l" defTabSz="914400" rtl="0" eaLnBrk="1" latinLnBrk="0" hangingPunct="1">
+      <a:defRPr sz="1800" kern="1200">
         <a:solidFill>
           <a:schemeClr val="tx1"/>
         </a:solidFill>
@@ -58,8 +58,8 @@
         <a:cs typeface="+mn-cs"/>
       </a:defRPr>
     </a:lvl4pPr>
-    <a:lvl5pPr algn="l" defTabSz="914400" eaLnBrk="1" hangingPunct="1" latinLnBrk="0" marL="1828800" rtl="0">
-      <a:defRPr kern="1200" sz="1800">
+    <a:lvl5pPr marL="1828800" algn="l" defTabSz="914400" rtl="0" eaLnBrk="1" latinLnBrk="0" hangingPunct="1">
+      <a:defRPr sz="1800" kern="1200">
         <a:solidFill>
           <a:schemeClr val="tx1"/>
         </a:solidFill>
@@ -68,8 +68,8 @@
         <a:cs typeface="+mn-cs"/>
       </a:defRPr>
     </a:lvl5pPr>
-    <a:lvl6pPr algn="l" defTabSz="914400" eaLnBrk="1" hangingPunct="1" latinLnBrk="0" marL="2286000" rtl="0">
-      <a:defRPr kern="1200" sz="1800">
+    <a:lvl6pPr marL="2286000" algn="l" defTabSz="914400" rtl="0" eaLnBrk="1" latinLnBrk="0" hangingPunct="1">
+      <a:defRPr sz="1800" kern="1200">
         <a:solidFill>
           <a:schemeClr val="tx1"/>
         </a:solidFill>
@@ -78,8 +78,8 @@
         <a:cs typeface="+mn-cs"/>
       </a:defRPr>
     </a:lvl6pPr>
-    <a:lvl7pPr algn="l" defTabSz="914400" eaLnBrk="1" hangingPunct="1" latinLnBrk="0" marL="2743200" rtl="0">
-      <a:defRPr kern="1200" sz="1800">
+    <a:lvl7pPr marL="2743200" algn="l" defTabSz="914400" rtl="0" eaLnBrk="1" latinLnBrk="0" hangingPunct="1">
+      <a:defRPr sz="1800" kern="1200">
         <a:solidFill>
           <a:schemeClr val="tx1"/>
         </a:solidFill>
@@ -88,8 +88,8 @@
         <a:cs typeface="+mn-cs"/>
       </a:defRPr>
     </a:lvl7pPr>
-    <a:lvl8pPr algn="l" defTabSz="914400" eaLnBrk="1" hangingPunct="1" latinLnBrk="0" marL="3200400" rtl="0">
-      <a:defRPr kern="1200" sz="1800">
+    <a:lvl8pPr marL="3200400" algn="l" defTabSz="914400" rtl="0" eaLnBrk="1" latinLnBrk="0" hangingPunct="1">
+      <a:defRPr sz="1800" kern="1200">
         <a:solidFill>
           <a:schemeClr val="tx1"/>
         </a:solidFill>
@@ -98,8 +98,8 @@
         <a:cs typeface="+mn-cs"/>
       </a:defRPr>
     </a:lvl8pPr>
-    <a:lvl9pPr algn="l" defTabSz="914400" eaLnBrk="1" hangingPunct="1" latinLnBrk="0" marL="3657600" rtl="0">
-      <a:defRPr kern="1200" sz="1800">
+    <a:lvl9pPr marL="3657600" algn="l" defTabSz="914400" rtl="0" eaLnBrk="1" latinLnBrk="0" hangingPunct="1">
+      <a:defRPr sz="1800" kern="1200">
         <a:solidFill>
           <a:schemeClr val="tx1"/>
         </a:solidFill>
@@ -109,6 +109,11 @@
       </a:defRPr>
     </a:lvl9pPr>
   </p:defaultTextStyle>
+  <p:extLst>
+    <p:ext uri="{EFAFB233-063F-42B5-8137-9DF3F51BA10A}">
+      <p15:sldGuideLst xmlns:p15="http://schemas.microsoft.com/office/powerpoint/2012/main"/>
+    </p:ext>
+  </p:extLst>
 </p:presentation>
 </file>
 
@@ -259,7 +264,7 @@
           <a:p>
             <a:fld id="{EED1C14C-A143-42F5-B247-D0E800131009}" type="datetimeFigureOut">
               <a:rPr lang="en-US" smtClean="0"/>
-              <a:t>8/15/2018</a:t>
+              <a:t>9/7/2023</a:t>
             </a:fld>
             <a:endParaRPr lang="en-US"/>
           </a:p>
@@ -457,7 +462,7 @@
           <a:p>
             <a:fld id="{EED1C14C-A143-42F5-B247-D0E800131009}" type="datetimeFigureOut">
               <a:rPr lang="en-US" smtClean="0"/>
-              <a:t>8/15/2018</a:t>
+              <a:t>9/7/2023</a:t>
             </a:fld>
             <a:endParaRPr lang="en-US"/>
           </a:p>
@@ -665,7 +670,7 @@
           <a:p>
             <a:fld id="{EED1C14C-A143-42F5-B247-D0E800131009}" type="datetimeFigureOut">
               <a:rPr lang="en-US" smtClean="0"/>
-              <a:t>8/15/2018</a:t>
+              <a:t>9/7/2023</a:t>
             </a:fld>
             <a:endParaRPr lang="en-US"/>
           </a:p>
@@ -863,7 +868,7 @@
           <a:p>
             <a:fld id="{EED1C14C-A143-42F5-B247-D0E800131009}" type="datetimeFigureOut">
               <a:rPr lang="en-US" smtClean="0"/>
-              <a:t>8/15/2018</a:t>
+              <a:t>9/7/2023</a:t>
             </a:fld>
             <a:endParaRPr lang="en-US"/>
           </a:p>
@@ -1138,7 +1143,7 @@
           <a:p>
             <a:fld id="{EED1C14C-A143-42F5-B247-D0E800131009}" type="datetimeFigureOut">
               <a:rPr lang="en-US" smtClean="0"/>
-              <a:t>8/15/2018</a:t>
+              <a:t>9/7/2023</a:t>
             </a:fld>
             <a:endParaRPr lang="en-US"/>
           </a:p>
@@ -1403,7 +1408,7 @@
           <a:p>
             <a:fld id="{EED1C14C-A143-42F5-B247-D0E800131009}" type="datetimeFigureOut">
               <a:rPr lang="en-US" smtClean="0"/>
-              <a:t>8/15/2018</a:t>
+              <a:t>9/7/2023</a:t>
             </a:fld>
             <a:endParaRPr lang="en-US"/>
           </a:p>
@@ -1815,7 +1820,7 @@
           <a:p>
             <a:fld id="{EED1C14C-A143-42F5-B247-D0E800131009}" type="datetimeFigureOut">
               <a:rPr lang="en-US" smtClean="0"/>
-              <a:t>8/15/2018</a:t>
+              <a:t>9/7/2023</a:t>
             </a:fld>
             <a:endParaRPr lang="en-US"/>
           </a:p>
@@ -1956,7 +1961,7 @@
           <a:p>
             <a:fld id="{EED1C14C-A143-42F5-B247-D0E800131009}" type="datetimeFigureOut">
               <a:rPr lang="en-US" smtClean="0"/>
-              <a:t>8/15/2018</a:t>
+              <a:t>9/7/2023</a:t>
             </a:fld>
             <a:endParaRPr lang="en-US"/>
           </a:p>
@@ -2069,7 +2074,7 @@
           <a:p>
             <a:fld id="{EED1C14C-A143-42F5-B247-D0E800131009}" type="datetimeFigureOut">
               <a:rPr lang="en-US" smtClean="0"/>
-              <a:t>8/15/2018</a:t>
+              <a:t>9/7/2023</a:t>
             </a:fld>
             <a:endParaRPr lang="en-US"/>
           </a:p>
@@ -2380,7 +2385,7 @@
           <a:p>
             <a:fld id="{EED1C14C-A143-42F5-B247-D0E800131009}" type="datetimeFigureOut">
               <a:rPr lang="en-US" smtClean="0"/>
-              <a:t>8/15/2018</a:t>
+              <a:t>9/7/2023</a:t>
             </a:fld>
             <a:endParaRPr lang="en-US"/>
           </a:p>
@@ -2668,7 +2673,7 @@
           <a:p>
             <a:fld id="{EED1C14C-A143-42F5-B247-D0E800131009}" type="datetimeFigureOut">
               <a:rPr lang="en-US" smtClean="0"/>
-              <a:t>8/15/2018</a:t>
+              <a:t>9/7/2023</a:t>
             </a:fld>
             <a:endParaRPr lang="en-US"/>
           </a:p>
@@ -2909,7 +2914,7 @@
           <a:p>
             <a:fld id="{EED1C14C-A143-42F5-B247-D0E800131009}" type="datetimeFigureOut">
               <a:rPr lang="en-US" smtClean="0"/>
-              <a:t>8/15/2018</a:t>
+              <a:t>9/7/2023</a:t>
             </a:fld>
             <a:endParaRPr lang="en-US"/>
           </a:p>
@@ -3310,7 +3315,7 @@
 </file>
 
 <file path=ppt/slides/slide1.xml><?xml version="1.0" encoding="utf-8"?>
-<p:sld xmlns:a="http://schemas.openxmlformats.org/drawingml/2006/main" xmlns:p="http://schemas.openxmlformats.org/presentationml/2006/main" xmlns:r="http://schemas.openxmlformats.org/officeDocument/2006/relationships">
+<p:sld xmlns:a="http://schemas.openxmlformats.org/drawingml/2006/main" xmlns:r="http://schemas.openxmlformats.org/officeDocument/2006/relationships" xmlns:p="http://schemas.openxmlformats.org/presentationml/2006/main">
   <p:cSld>
     <p:spTree>
       <p:nvGrpSpPr>
@@ -3328,18 +3333,18 @@
       </p:grpSpPr>
       <p:sp>
         <p:nvSpPr>
-          <p:cNvPr id="0" name="slide1">
-            <a:extLst>
-              <a:ext uri="{FF2B5EF4-FFF2-40B4-BE49-F238E27FC236}">
-                <a16:creationId xmlns:a16="http://schemas.microsoft.com/office/drawing/2014/main" id="{2963D578-E7B0-4209-B2DD-7405B186A32A}"/>
-              </a:ext>
-            </a:extLst>
-          </p:cNvPr>
-          <p:cNvSpPr>
-            <a:spLocks noGrp="1"/>
-          </p:cNvSpPr>
-          <p:nvPr>
-            <p:ph idx="0" type="ctrTitle"/>
+          <p:cNvPr id="2" name="slide1">
+            <a:extLst>
+              <a:ext uri="{FF2B5EF4-FFF2-40B4-BE49-F238E27FC236}">
+                <a16:creationId xmlns:a16="http://schemas.microsoft.com/office/drawing/2014/main" id="{57FB0555-AAAE-4950-BFAF-8288D905B599}"/>
+              </a:ext>
+            </a:extLst>
+          </p:cNvPr>
+          <p:cNvSpPr>
+            <a:spLocks noGrp="1"/>
+          </p:cNvSpPr>
+          <p:nvPr>
+            <p:ph type="ctrTitle"/>
           </p:nvPr>
         </p:nvSpPr>
         <p:spPr/>
@@ -3348,7 +3353,6 @@
           <a:lstStyle/>
           <a:p>
             <a:r>
-              <a:rPr/>
               <a:t>Book1</a:t>
             </a:r>
           </a:p>
@@ -3356,18 +3360,18 @@
       </p:sp>
       <p:sp>
         <p:nvSpPr>
-          <p:cNvPr id="1" name="slide1">
-            <a:extLst>
-              <a:ext uri="{FF2B5EF4-FFF2-40B4-BE49-F238E27FC236}">
-                <a16:creationId xmlns:a16="http://schemas.microsoft.com/office/drawing/2014/main" id="{54866391-F316-4663-9C64-3D27A4AADAE5}"/>
-              </a:ext>
-            </a:extLst>
-          </p:cNvPr>
-          <p:cNvSpPr>
-            <a:spLocks noGrp="1"/>
-          </p:cNvSpPr>
-          <p:nvPr>
-            <p:ph idx="1" type="subTitle"/>
+          <p:cNvPr id="3" name="slide1">
+            <a:extLst>
+              <a:ext uri="{FF2B5EF4-FFF2-40B4-BE49-F238E27FC236}">
+                <a16:creationId xmlns:a16="http://schemas.microsoft.com/office/drawing/2014/main" id="{510F8242-87EB-4F29-AD3B-F26C5E91306C}"/>
+              </a:ext>
+            </a:extLst>
+          </p:cNvPr>
+          <p:cNvSpPr>
+            <a:spLocks noGrp="1"/>
+          </p:cNvSpPr>
+          <p:nvPr>
+            <p:ph type="subTitle" idx="1"/>
           </p:nvPr>
         </p:nvSpPr>
         <p:spPr/>
@@ -3376,8 +3380,7 @@
           <a:lstStyle/>
           <a:p>
             <a:r>
-              <a:rPr/>
-              <a:t>File created on: 9/7/2023 7:36:20 PM</a:t>
+              <a:t>File created on: 9/7/2023 7:39:24 PM</a:t>
             </a:r>
           </a:p>
         </p:txBody>
@@ -3396,7 +3399,7 @@
 </file>
 
 <file path=ppt/slides/slide2.xml><?xml version="1.0" encoding="utf-8"?>
-<p:sld xmlns:a="http://schemas.openxmlformats.org/drawingml/2006/main" xmlns:p="http://schemas.openxmlformats.org/presentationml/2006/main" xmlns:r="http://schemas.openxmlformats.org/officeDocument/2006/relationships">
+<p:sld xmlns:a="http://schemas.openxmlformats.org/drawingml/2006/main" xmlns:r="http://schemas.openxmlformats.org/officeDocument/2006/relationships" xmlns:p="http://schemas.openxmlformats.org/presentationml/2006/main">
   <p:cSld>
     <p:spTree>
       <p:nvGrpSpPr>
@@ -3414,10 +3417,10 @@
       </p:grpSpPr>
       <p:pic>
         <p:nvPicPr>
-          <p:cNvPr descr="Customers sales" id="2" name="slide2">
-            <a:extLst>
-              <a:ext uri="{FF2B5EF4-FFF2-40B4-BE49-F238E27FC236}">
-                <a16:creationId xmlns:a16="http://schemas.microsoft.com/office/drawing/2014/main" id="{F7CB6346-6D52-4F0C-BE8C-E7A11A88C74A}"/>
+          <p:cNvPr id="4" name="slide2" descr="Customers sales">
+            <a:extLst>
+              <a:ext uri="{FF2B5EF4-FFF2-40B4-BE49-F238E27FC236}">
+                <a16:creationId xmlns:a16="http://schemas.microsoft.com/office/drawing/2014/main" id="{5DB882E0-11C1-415B-9F0D-AA067949B0CB}"/>
               </a:ext>
             </a:extLst>
           </p:cNvPr>
@@ -3427,7 +3430,7 @@
           <p:nvPr/>
         </p:nvPicPr>
         <p:blipFill>
-          <a:blip r:embed="rId7">
+          <a:blip r:embed="rId2">
             <a:extLst>
               <a:ext uri="{28A0092B-C50C-407E-A947-70E740481C1C}">
                 <a14:useLocalDpi xmlns:a14="http://schemas.microsoft.com/office/drawing/2010/main" val="0"/>
@@ -3451,7 +3454,7 @@
     </p:spTree>
     <p:extLst>
       <p:ext uri="{BB962C8B-B14F-4D97-AF65-F5344CB8AC3E}">
-        <p14:creationId xmlns:p14="http://schemas.microsoft.com/office/powerpoint/2010/main" val="95992585"/>
+        <p14:creationId xmlns:p14="http://schemas.microsoft.com/office/powerpoint/2010/main" val="3012587430"/>
       </p:ext>
     </p:extLst>
   </p:cSld>
@@ -3462,7 +3465,7 @@
 </file>
 
 <file path=ppt/slides/slide3.xml><?xml version="1.0" encoding="utf-8"?>
-<p:sld xmlns:a="http://schemas.openxmlformats.org/drawingml/2006/main" xmlns:p="http://schemas.openxmlformats.org/presentationml/2006/main" xmlns:r="http://schemas.openxmlformats.org/officeDocument/2006/relationships">
+<p:sld xmlns:a="http://schemas.openxmlformats.org/drawingml/2006/main" xmlns:r="http://schemas.openxmlformats.org/officeDocument/2006/relationships" xmlns:p="http://schemas.openxmlformats.org/presentationml/2006/main">
   <p:cSld>
     <p:spTree>
       <p:nvGrpSpPr>
@@ -3480,10 +3483,10 @@
       </p:grpSpPr>
       <p:pic>
         <p:nvPicPr>
-          <p:cNvPr descr="Profit chart" id="3" name="slide3">
-            <a:extLst>
-              <a:ext uri="{FF2B5EF4-FFF2-40B4-BE49-F238E27FC236}">
-                <a16:creationId xmlns:a16="http://schemas.microsoft.com/office/drawing/2014/main" id="{54AAAA9F-46E3-4DEA-AF2F-F1EE717B0868}"/>
+          <p:cNvPr id="2" name="slide2" descr="Profit chart">
+            <a:extLst>
+              <a:ext uri="{FF2B5EF4-FFF2-40B4-BE49-F238E27FC236}">
+                <a16:creationId xmlns:a16="http://schemas.microsoft.com/office/drawing/2014/main" id="{0D752225-8BE3-4E70-9B09-18DE74A780DA}"/>
               </a:ext>
             </a:extLst>
           </p:cNvPr>
@@ -3493,7 +3496,7 @@
           <p:nvPr/>
         </p:nvPicPr>
         <p:blipFill>
-          <a:blip r:embed="rId8">
+          <a:blip r:embed="rId2">
             <a:extLst>
               <a:ext uri="{28A0092B-C50C-407E-A947-70E740481C1C}">
                 <a14:useLocalDpi xmlns:a14="http://schemas.microsoft.com/office/drawing/2010/main" val="0"/>
@@ -3506,8 +3509,8 @@
         </p:blipFill>
         <p:spPr>
           <a:xfrm>
-            <a:off x="5011081" y="0"/>
-            <a:ext cx="2169837" cy="6858000"/>
+            <a:off x="2154805" y="71562"/>
+            <a:ext cx="6941488" cy="6019137"/>
           </a:xfrm>
           <a:prstGeom prst="rect">
             <a:avLst/>
@@ -3528,7 +3531,7 @@
 </file>
 
 <file path=ppt/slides/slide4.xml><?xml version="1.0" encoding="utf-8"?>
-<p:sld xmlns:a="http://schemas.openxmlformats.org/drawingml/2006/main" xmlns:p="http://schemas.openxmlformats.org/presentationml/2006/main" xmlns:r="http://schemas.openxmlformats.org/officeDocument/2006/relationships">
+<p:sld xmlns:a="http://schemas.openxmlformats.org/drawingml/2006/main" xmlns:r="http://schemas.openxmlformats.org/officeDocument/2006/relationships" xmlns:p="http://schemas.openxmlformats.org/presentationml/2006/main">
   <p:cSld>
     <p:spTree>
       <p:nvGrpSpPr>
@@ -3546,10 +3549,10 @@
       </p:grpSpPr>
       <p:pic>
         <p:nvPicPr>
-          <p:cNvPr descr="Sales Bubble chart " id="4" name="slide4">
-            <a:extLst>
-              <a:ext uri="{FF2B5EF4-FFF2-40B4-BE49-F238E27FC236}">
-                <a16:creationId xmlns:a16="http://schemas.microsoft.com/office/drawing/2014/main" id="{734B2794-2C31-4DF6-B209-30A569C88CAC}"/>
+          <p:cNvPr id="3" name="slide3" descr="Cuisine Sales &amp;amp; Profits">
+            <a:extLst>
+              <a:ext uri="{FF2B5EF4-FFF2-40B4-BE49-F238E27FC236}">
+                <a16:creationId xmlns:a16="http://schemas.microsoft.com/office/drawing/2014/main" id="{391BDFF4-8F81-4F6B-89E1-38988F83404A}"/>
               </a:ext>
             </a:extLst>
           </p:cNvPr>
@@ -3559,7 +3562,7 @@
           <p:nvPr/>
         </p:nvPicPr>
         <p:blipFill>
-          <a:blip r:embed="rId9">
+          <a:blip r:embed="rId2">
             <a:extLst>
               <a:ext uri="{28A0092B-C50C-407E-A947-70E740481C1C}">
                 <a14:useLocalDpi xmlns:a14="http://schemas.microsoft.com/office/drawing/2010/main" val="0"/>
@@ -3572,8 +3575,8 @@
         </p:blipFill>
         <p:spPr>
           <a:xfrm>
-            <a:off x="2625486" y="0"/>
-            <a:ext cx="6941027" cy="6858000"/>
+            <a:off x="1892410" y="0"/>
+            <a:ext cx="6050943" cy="6858000"/>
           </a:xfrm>
           <a:prstGeom prst="rect">
             <a:avLst/>
@@ -3594,7 +3597,7 @@
 </file>
 
 <file path=ppt/slides/slide5.xml><?xml version="1.0" encoding="utf-8"?>
-<p:sld xmlns:a="http://schemas.openxmlformats.org/drawingml/2006/main" xmlns:p="http://schemas.openxmlformats.org/presentationml/2006/main" xmlns:r="http://schemas.openxmlformats.org/officeDocument/2006/relationships">
+<p:sld xmlns:a="http://schemas.openxmlformats.org/drawingml/2006/main" xmlns:r="http://schemas.openxmlformats.org/officeDocument/2006/relationships" xmlns:p="http://schemas.openxmlformats.org/presentationml/2006/main">
   <p:cSld>
     <p:spTree>
       <p:nvGrpSpPr>
@@ -3612,10 +3615,10 @@
       </p:grpSpPr>
       <p:pic>
         <p:nvPicPr>
-          <p:cNvPr descr="Cuisine Sales &amp;amp; Profits" id="5" name="slide5">
-            <a:extLst>
-              <a:ext uri="{FF2B5EF4-FFF2-40B4-BE49-F238E27FC236}">
-                <a16:creationId xmlns:a16="http://schemas.microsoft.com/office/drawing/2014/main" id="{0675A4BF-3FAA-43B2-B627-0E0D553A3D3C}"/>
+          <p:cNvPr id="4" name="slide3" descr="Sales Bubble chart ">
+            <a:extLst>
+              <a:ext uri="{FF2B5EF4-FFF2-40B4-BE49-F238E27FC236}">
+                <a16:creationId xmlns:a16="http://schemas.microsoft.com/office/drawing/2014/main" id="{B680D898-B1FC-45F8-85D9-85FF729962BC}"/>
               </a:ext>
             </a:extLst>
           </p:cNvPr>
@@ -3625,7 +3628,7 @@
           <p:nvPr/>
         </p:nvPicPr>
         <p:blipFill>
-          <a:blip r:embed="rId10">
+          <a:blip r:embed="rId2">
             <a:extLst>
               <a:ext uri="{28A0092B-C50C-407E-A947-70E740481C1C}">
                 <a14:useLocalDpi xmlns:a14="http://schemas.microsoft.com/office/drawing/2010/main" val="0"/>
@@ -3638,8 +3641,8 @@
         </p:blipFill>
         <p:spPr>
           <a:xfrm>
-            <a:off x="4604229" y="0"/>
-            <a:ext cx="2983540" cy="6858000"/>
+            <a:off x="2625486" y="0"/>
+            <a:ext cx="6941027" cy="6858000"/>
           </a:xfrm>
           <a:prstGeom prst="rect">
             <a:avLst/>
@@ -3649,7 +3652,7 @@
     </p:spTree>
     <p:extLst>
       <p:ext uri="{BB962C8B-B14F-4D97-AF65-F5344CB8AC3E}">
-        <p14:creationId xmlns:p14="http://schemas.microsoft.com/office/powerpoint/2010/main" val="95992585"/>
+        <p14:creationId xmlns:p14="http://schemas.microsoft.com/office/powerpoint/2010/main" val="1216775846"/>
       </p:ext>
     </p:extLst>
   </p:cSld>
@@ -3660,7 +3663,7 @@
 </file>
 
 <file path=ppt/slides/slide6.xml><?xml version="1.0" encoding="utf-8"?>
-<p:sld xmlns:a="http://schemas.openxmlformats.org/drawingml/2006/main" xmlns:p="http://schemas.openxmlformats.org/presentationml/2006/main" xmlns:r="http://schemas.openxmlformats.org/officeDocument/2006/relationships">
+<p:sld xmlns:a="http://schemas.openxmlformats.org/drawingml/2006/main" xmlns:r="http://schemas.openxmlformats.org/officeDocument/2006/relationships" xmlns:p="http://schemas.openxmlformats.org/presentationml/2006/main">
   <p:cSld>
     <p:spTree>
       <p:nvGrpSpPr>
@@ -3678,10 +3681,10 @@
       </p:grpSpPr>
       <p:pic>
         <p:nvPicPr>
-          <p:cNvPr descr="Dashboard 1" id="6" name="slide6">
-            <a:extLst>
-              <a:ext uri="{FF2B5EF4-FFF2-40B4-BE49-F238E27FC236}">
-                <a16:creationId xmlns:a16="http://schemas.microsoft.com/office/drawing/2014/main" id="{E3854446-DDC5-424E-9E21-5F82C7537787}"/>
+          <p:cNvPr id="4" name="slide2" descr="Dashboard 1">
+            <a:extLst>
+              <a:ext uri="{FF2B5EF4-FFF2-40B4-BE49-F238E27FC236}">
+                <a16:creationId xmlns:a16="http://schemas.microsoft.com/office/drawing/2014/main" id="{6E4BBDA6-5AA1-4355-A029-57A5A8F225C8}"/>
               </a:ext>
             </a:extLst>
           </p:cNvPr>
@@ -3691,7 +3694,7 @@
           <p:nvPr/>
         </p:nvPicPr>
         <p:blipFill>
-          <a:blip r:embed="rId11">
+          <a:blip r:embed="rId2">
             <a:extLst>
               <a:ext uri="{28A0092B-C50C-407E-A947-70E740481C1C}">
                 <a14:useLocalDpi xmlns:a14="http://schemas.microsoft.com/office/drawing/2010/main" val="0"/>
@@ -3704,7 +3707,7 @@
         </p:blipFill>
         <p:spPr>
           <a:xfrm>
-            <a:off x="1809750" y="0"/>
+            <a:off x="1897214" y="222636"/>
             <a:ext cx="8572500" cy="6858000"/>
           </a:xfrm>
           <a:prstGeom prst="rect">
@@ -3715,37 +3718,7 @@
     </p:spTree>
     <p:extLst>
       <p:ext uri="{BB962C8B-B14F-4D97-AF65-F5344CB8AC3E}">
-        <p14:creationId xmlns:p14="http://schemas.microsoft.com/office/powerpoint/2010/main" val="95992585"/>
-      </p:ext>
-    </p:extLst>
-  </p:cSld>
-  <p:clrMapOvr>
-    <a:masterClrMapping/>
-  </p:clrMapOvr>
-</p:sld>
-</file>
-
-<file path=ppt/slides/slideTemplate.xml><?xml version="1.0" encoding="utf-8"?>
-<p:sld xmlns:a="http://schemas.openxmlformats.org/drawingml/2006/main" xmlns:r="http://schemas.openxmlformats.org/officeDocument/2006/relationships" xmlns:p="http://schemas.openxmlformats.org/presentationml/2006/main">
-  <p:cSld>
-    <p:spTree>
-      <p:nvGrpSpPr>
-        <p:cNvPr id="1" name=""/>
-        <p:cNvGrpSpPr/>
-        <p:nvPr/>
-      </p:nvGrpSpPr>
-      <p:grpSpPr>
-        <a:xfrm>
-          <a:off x="0" y="0"/>
-          <a:ext cx="0" cy="0"/>
-          <a:chOff x="0" y="0"/>
-          <a:chExt cx="0" cy="0"/>
-        </a:xfrm>
-      </p:grpSpPr>
-    </p:spTree>
-    <p:extLst>
-      <p:ext uri="{BB962C8B-B14F-4D97-AF65-F5344CB8AC3E}">
-        <p14:creationId xmlns:p14="http://schemas.microsoft.com/office/powerpoint/2010/main" val="95992585"/>
+        <p14:creationId xmlns:p14="http://schemas.microsoft.com/office/powerpoint/2010/main" val="3295807200"/>
       </p:ext>
     </p:extLst>
   </p:cSld>

</xml_diff>